<commit_message>
Launching version. No ranking + disable buttons when window on
</commit_message>
<xml_diff>
--- a/TriFunction/Pictures.pptx
+++ b/TriFunction/Pictures.pptx
@@ -216,7 +216,7 @@
           <a:p>
             <a:fld id="{7A69A65F-D152-468D-9567-D5957D3F5103}" type="datetimeFigureOut">
               <a:rPr lang="ko-KR" altLang="en-US" smtClean="0"/>
-              <a:t>2018-11-05</a:t>
+              <a:t>2018-11-26</a:t>
             </a:fld>
             <a:endParaRPr lang="ko-KR" altLang="en-US"/>
           </a:p>
@@ -615,7 +615,7 @@
           <a:p>
             <a:fld id="{39D6D5D5-D1C6-465B-B735-E2307C7708EA}" type="datetimeFigureOut">
               <a:rPr lang="ko-KR" altLang="en-US" smtClean="0"/>
-              <a:t>2018-11-05</a:t>
+              <a:t>2018-11-26</a:t>
             </a:fld>
             <a:endParaRPr lang="ko-KR" altLang="en-US"/>
           </a:p>
@@ -785,7 +785,7 @@
           <a:p>
             <a:fld id="{39D6D5D5-D1C6-465B-B735-E2307C7708EA}" type="datetimeFigureOut">
               <a:rPr lang="ko-KR" altLang="en-US" smtClean="0"/>
-              <a:t>2018-11-05</a:t>
+              <a:t>2018-11-26</a:t>
             </a:fld>
             <a:endParaRPr lang="ko-KR" altLang="en-US"/>
           </a:p>
@@ -965,7 +965,7 @@
           <a:p>
             <a:fld id="{39D6D5D5-D1C6-465B-B735-E2307C7708EA}" type="datetimeFigureOut">
               <a:rPr lang="ko-KR" altLang="en-US" smtClean="0"/>
-              <a:t>2018-11-05</a:t>
+              <a:t>2018-11-26</a:t>
             </a:fld>
             <a:endParaRPr lang="ko-KR" altLang="en-US"/>
           </a:p>
@@ -1135,7 +1135,7 @@
           <a:p>
             <a:fld id="{39D6D5D5-D1C6-465B-B735-E2307C7708EA}" type="datetimeFigureOut">
               <a:rPr lang="ko-KR" altLang="en-US" smtClean="0"/>
-              <a:t>2018-11-05</a:t>
+              <a:t>2018-11-26</a:t>
             </a:fld>
             <a:endParaRPr lang="ko-KR" altLang="en-US"/>
           </a:p>
@@ -1381,7 +1381,7 @@
           <a:p>
             <a:fld id="{39D6D5D5-D1C6-465B-B735-E2307C7708EA}" type="datetimeFigureOut">
               <a:rPr lang="ko-KR" altLang="en-US" smtClean="0"/>
-              <a:t>2018-11-05</a:t>
+              <a:t>2018-11-26</a:t>
             </a:fld>
             <a:endParaRPr lang="ko-KR" altLang="en-US"/>
           </a:p>
@@ -1613,7 +1613,7 @@
           <a:p>
             <a:fld id="{39D6D5D5-D1C6-465B-B735-E2307C7708EA}" type="datetimeFigureOut">
               <a:rPr lang="ko-KR" altLang="en-US" smtClean="0"/>
-              <a:t>2018-11-05</a:t>
+              <a:t>2018-11-26</a:t>
             </a:fld>
             <a:endParaRPr lang="ko-KR" altLang="en-US"/>
           </a:p>
@@ -1980,7 +1980,7 @@
           <a:p>
             <a:fld id="{39D6D5D5-D1C6-465B-B735-E2307C7708EA}" type="datetimeFigureOut">
               <a:rPr lang="ko-KR" altLang="en-US" smtClean="0"/>
-              <a:t>2018-11-05</a:t>
+              <a:t>2018-11-26</a:t>
             </a:fld>
             <a:endParaRPr lang="ko-KR" altLang="en-US"/>
           </a:p>
@@ -2098,7 +2098,7 @@
           <a:p>
             <a:fld id="{39D6D5D5-D1C6-465B-B735-E2307C7708EA}" type="datetimeFigureOut">
               <a:rPr lang="ko-KR" altLang="en-US" smtClean="0"/>
-              <a:t>2018-11-05</a:t>
+              <a:t>2018-11-26</a:t>
             </a:fld>
             <a:endParaRPr lang="ko-KR" altLang="en-US"/>
           </a:p>
@@ -2193,7 +2193,7 @@
           <a:p>
             <a:fld id="{39D6D5D5-D1C6-465B-B735-E2307C7708EA}" type="datetimeFigureOut">
               <a:rPr lang="ko-KR" altLang="en-US" smtClean="0"/>
-              <a:t>2018-11-05</a:t>
+              <a:t>2018-11-26</a:t>
             </a:fld>
             <a:endParaRPr lang="ko-KR" altLang="en-US"/>
           </a:p>
@@ -2470,7 +2470,7 @@
           <a:p>
             <a:fld id="{39D6D5D5-D1C6-465B-B735-E2307C7708EA}" type="datetimeFigureOut">
               <a:rPr lang="ko-KR" altLang="en-US" smtClean="0"/>
-              <a:t>2018-11-05</a:t>
+              <a:t>2018-11-26</a:t>
             </a:fld>
             <a:endParaRPr lang="ko-KR" altLang="en-US"/>
           </a:p>
@@ -2723,7 +2723,7 @@
           <a:p>
             <a:fld id="{39D6D5D5-D1C6-465B-B735-E2307C7708EA}" type="datetimeFigureOut">
               <a:rPr lang="ko-KR" altLang="en-US" smtClean="0"/>
-              <a:t>2018-11-05</a:t>
+              <a:t>2018-11-26</a:t>
             </a:fld>
             <a:endParaRPr lang="ko-KR" altLang="en-US"/>
           </a:p>
@@ -2936,7 +2936,7 @@
           <a:p>
             <a:fld id="{39D6D5D5-D1C6-465B-B735-E2307C7708EA}" type="datetimeFigureOut">
               <a:rPr lang="ko-KR" altLang="en-US" smtClean="0"/>
-              <a:t>2018-11-05</a:t>
+              <a:t>2018-11-26</a:t>
             </a:fld>
             <a:endParaRPr lang="ko-KR" altLang="en-US"/>
           </a:p>
@@ -8446,6 +8446,216 @@
           </a:p>
         </p:txBody>
       </p:sp>
+      <p:pic>
+        <p:nvPicPr>
+          <p:cNvPr id="11" name="그림 10"/>
+          <p:cNvPicPr>
+            <a:picLocks noChangeAspect="1"/>
+          </p:cNvPicPr>
+          <p:nvPr/>
+        </p:nvPicPr>
+        <p:blipFill>
+          <a:blip r:embed="rId2">
+            <a:extLst>
+              <a:ext uri="{BEBA8EAE-BF5A-486C-A8C5-ECC9F3942E4B}">
+                <a14:imgProps xmlns:a14="http://schemas.microsoft.com/office/drawing/2010/main">
+                  <a14:imgLayer r:embed="rId3">
+                    <a14:imgEffect>
+                      <a14:backgroundRemoval t="2326" b="90698" l="2381" r="95238">
+                        <a14:foregroundMark x1="16667" y1="18605" x2="16667" y2="18605"/>
+                        <a14:foregroundMark x1="4762" y1="37209" x2="4762" y2="37209"/>
+                        <a14:foregroundMark x1="9524" y1="44186" x2="9524" y2="44186"/>
+                        <a14:foregroundMark x1="11905" y1="60465" x2="11905" y2="60465"/>
+                        <a14:foregroundMark x1="2381" y1="53488" x2="2381" y2="53488"/>
+                        <a14:foregroundMark x1="9524" y1="67442" x2="9524" y2="67442"/>
+                        <a14:foregroundMark x1="19048" y1="79070" x2="21429" y2="79070"/>
+                        <a14:foregroundMark x1="95238" y1="51163" x2="95238" y2="51163"/>
+                        <a14:foregroundMark x1="54762" y1="4651" x2="54762" y2="4651"/>
+                        <a14:foregroundMark x1="52381" y1="93023" x2="52381" y2="93023"/>
+                        <a14:foregroundMark x1="95238" y1="51163" x2="95238" y2="51163"/>
+                      </a14:backgroundRemoval>
+                    </a14:imgEffect>
+                  </a14:imgLayer>
+                </a14:imgProps>
+              </a:ext>
+              <a:ext uri="{28A0092B-C50C-407E-A947-70E740481C1C}">
+                <a14:useLocalDpi xmlns:a14="http://schemas.microsoft.com/office/drawing/2010/main" val="0"/>
+              </a:ext>
+            </a:extLst>
+          </a:blip>
+          <a:stretch>
+            <a:fillRect/>
+          </a:stretch>
+        </p:blipFill>
+        <p:spPr>
+          <a:xfrm>
+            <a:off x="3852083" y="4667032"/>
+            <a:ext cx="533400" cy="546100"/>
+          </a:xfrm>
+          <a:prstGeom prst="rect">
+            <a:avLst/>
+          </a:prstGeom>
+        </p:spPr>
+      </p:pic>
+      <p:pic>
+        <p:nvPicPr>
+          <p:cNvPr id="12" name="그림 11"/>
+          <p:cNvPicPr>
+            <a:picLocks noChangeAspect="1"/>
+          </p:cNvPicPr>
+          <p:nvPr/>
+        </p:nvPicPr>
+        <p:blipFill>
+          <a:blip r:embed="rId4">
+            <a:extLst>
+              <a:ext uri="{BEBA8EAE-BF5A-486C-A8C5-ECC9F3942E4B}">
+                <a14:imgProps xmlns:a14="http://schemas.microsoft.com/office/drawing/2010/main">
+                  <a14:imgLayer r:embed="rId5">
+                    <a14:imgEffect>
+                      <a14:backgroundRemoval t="9524" b="95238" l="4762" r="95238">
+                        <a14:foregroundMark x1="19048" y1="14286" x2="19048" y2="14286"/>
+                        <a14:foregroundMark x1="23810" y1="33333" x2="23810" y2="33333"/>
+                        <a14:foregroundMark x1="26190" y1="54762" x2="26190" y2="54762"/>
+                        <a14:foregroundMark x1="21429" y1="40476" x2="21429" y2="40476"/>
+                        <a14:foregroundMark x1="4762" y1="42857" x2="4762" y2="42857"/>
+                        <a14:foregroundMark x1="19048" y1="64286" x2="19048" y2="64286"/>
+                        <a14:foregroundMark x1="14286" y1="73810" x2="14286" y2="73810"/>
+                        <a14:foregroundMark x1="97619" y1="50000" x2="97619" y2="50000"/>
+                        <a14:foregroundMark x1="52381" y1="95238" x2="52381" y2="95238"/>
+                      </a14:backgroundRemoval>
+                    </a14:imgEffect>
+                  </a14:imgLayer>
+                </a14:imgProps>
+              </a:ext>
+              <a:ext uri="{28A0092B-C50C-407E-A947-70E740481C1C}">
+                <a14:useLocalDpi xmlns:a14="http://schemas.microsoft.com/office/drawing/2010/main" val="0"/>
+              </a:ext>
+            </a:extLst>
+          </a:blip>
+          <a:stretch>
+            <a:fillRect/>
+          </a:stretch>
+        </p:blipFill>
+        <p:spPr>
+          <a:xfrm>
+            <a:off x="10066758" y="4206657"/>
+            <a:ext cx="533400" cy="533400"/>
+          </a:xfrm>
+          <a:prstGeom prst="rect">
+            <a:avLst/>
+          </a:prstGeom>
+        </p:spPr>
+      </p:pic>
+      <p:pic>
+        <p:nvPicPr>
+          <p:cNvPr id="13" name="그림 12"/>
+          <p:cNvPicPr>
+            <a:picLocks noChangeAspect="1"/>
+          </p:cNvPicPr>
+          <p:nvPr/>
+        </p:nvPicPr>
+        <p:blipFill>
+          <a:blip r:embed="rId6">
+            <a:extLst>
+              <a:ext uri="{BEBA8EAE-BF5A-486C-A8C5-ECC9F3942E4B}">
+                <a14:imgProps xmlns:a14="http://schemas.microsoft.com/office/drawing/2010/main">
+                  <a14:imgLayer r:embed="rId7">
+                    <a14:imgEffect>
+                      <a14:backgroundRemoval t="2381" b="92857" l="4762" r="95238">
+                        <a14:foregroundMark x1="16667" y1="19048" x2="16667" y2="19048"/>
+                        <a14:foregroundMark x1="19048" y1="33333" x2="19048" y2="33333"/>
+                        <a14:foregroundMark x1="7143" y1="35714" x2="7143" y2="35714"/>
+                        <a14:foregroundMark x1="7143" y1="35714" x2="7143" y2="35714"/>
+                        <a14:foregroundMark x1="14286" y1="52381" x2="14286" y2="52381"/>
+                        <a14:foregroundMark x1="4762" y1="54762" x2="4762" y2="54762"/>
+                        <a14:foregroundMark x1="16667" y1="69048" x2="16667" y2="69048"/>
+                        <a14:foregroundMark x1="21429" y1="78571" x2="21429" y2="78571"/>
+                        <a14:foregroundMark x1="33333" y1="88095" x2="33333" y2="88095"/>
+                        <a14:foregroundMark x1="57143" y1="4762" x2="57143" y2="4762"/>
+                        <a14:foregroundMark x1="47619" y1="2381" x2="47619" y2="2381"/>
+                        <a14:foregroundMark x1="88095" y1="28571" x2="88095" y2="28571"/>
+                        <a14:foregroundMark x1="95238" y1="42857" x2="95238" y2="42857"/>
+                        <a14:foregroundMark x1="97619" y1="52381" x2="97619" y2="52381"/>
+                        <a14:foregroundMark x1="61905" y1="92857" x2="61905" y2="92857"/>
+                      </a14:backgroundRemoval>
+                    </a14:imgEffect>
+                  </a14:imgLayer>
+                </a14:imgProps>
+              </a:ext>
+              <a:ext uri="{28A0092B-C50C-407E-A947-70E740481C1C}">
+                <a14:useLocalDpi xmlns:a14="http://schemas.microsoft.com/office/drawing/2010/main" val="0"/>
+              </a:ext>
+            </a:extLst>
+          </a:blip>
+          <a:stretch>
+            <a:fillRect/>
+          </a:stretch>
+        </p:blipFill>
+        <p:spPr>
+          <a:xfrm>
+            <a:off x="9278347" y="4241582"/>
+            <a:ext cx="533400" cy="533400"/>
+          </a:xfrm>
+          <a:prstGeom prst="rect">
+            <a:avLst/>
+          </a:prstGeom>
+        </p:spPr>
+      </p:pic>
+      <p:pic>
+        <p:nvPicPr>
+          <p:cNvPr id="14" name="그림 13"/>
+          <p:cNvPicPr>
+            <a:picLocks noChangeAspect="1"/>
+          </p:cNvPicPr>
+          <p:nvPr/>
+        </p:nvPicPr>
+        <p:blipFill>
+          <a:blip r:embed="rId8">
+            <a:extLst>
+              <a:ext uri="{BEBA8EAE-BF5A-486C-A8C5-ECC9F3942E4B}">
+                <a14:imgProps xmlns:a14="http://schemas.microsoft.com/office/drawing/2010/main">
+                  <a14:imgLayer r:embed="rId9">
+                    <a14:imgEffect>
+                      <a14:backgroundRemoval t="2326" b="97674" l="4762" r="90476">
+                        <a14:foregroundMark x1="19048" y1="16279" x2="19048" y2="16279"/>
+                        <a14:foregroundMark x1="19048" y1="39535" x2="19048" y2="39535"/>
+                        <a14:foregroundMark x1="4762" y1="39535" x2="4762" y2="39535"/>
+                        <a14:foregroundMark x1="14286" y1="53488" x2="14286" y2="53488"/>
+                        <a14:foregroundMark x1="14286" y1="67442" x2="14286" y2="67442"/>
+                        <a14:foregroundMark x1="26190" y1="74419" x2="26190" y2="74419"/>
+                        <a14:foregroundMark x1="35714" y1="81395" x2="35714" y2="81395"/>
+                        <a14:foregroundMark x1="47619" y1="81395" x2="47619" y2="81395"/>
+                        <a14:foregroundMark x1="57143" y1="81395" x2="57143" y2="81395"/>
+                        <a14:foregroundMark x1="69048" y1="76744" x2="69048" y2="76744"/>
+                        <a14:foregroundMark x1="78571" y1="62791" x2="78571" y2="62791"/>
+                        <a14:foregroundMark x1="61905" y1="32558" x2="61905" y2="32558"/>
+                        <a14:foregroundMark x1="95238" y1="48837" x2="95238" y2="48837"/>
+                        <a14:foregroundMark x1="54762" y1="4651" x2="54762" y2="4651"/>
+                        <a14:foregroundMark x1="50000" y1="97674" x2="50000" y2="97674"/>
+                      </a14:backgroundRemoval>
+                    </a14:imgEffect>
+                  </a14:imgLayer>
+                </a14:imgProps>
+              </a:ext>
+              <a:ext uri="{28A0092B-C50C-407E-A947-70E740481C1C}">
+                <a14:useLocalDpi xmlns:a14="http://schemas.microsoft.com/office/drawing/2010/main" val="0"/>
+              </a:ext>
+            </a:extLst>
+          </a:blip>
+          <a:stretch>
+            <a:fillRect/>
+          </a:stretch>
+        </p:blipFill>
+        <p:spPr>
+          <a:xfrm>
+            <a:off x="3084022" y="4473357"/>
+            <a:ext cx="533400" cy="546100"/>
+          </a:xfrm>
+          <a:prstGeom prst="rect">
+            <a:avLst/>
+          </a:prstGeom>
+        </p:spPr>
+      </p:pic>
     </p:spTree>
     <p:extLst>
       <p:ext uri="{BB962C8B-B14F-4D97-AF65-F5344CB8AC3E}">

</xml_diff>